<commit_message>
ESupply Swagger 적용 + (주)차베스 공통Css 적용
</commit_message>
<xml_diff>
--- a/설계/01. 화면정의서/(주)차베스전기_화면정의서.pptx
+++ b/설계/01. 화면정의서/(주)차베스전기_화면정의서.pptx
@@ -261,7 +261,7 @@
           <a:p>
             <a:fld id="{4E6F5B6F-16CC-4A24-B7E1-C8CC67323470}" type="datetimeFigureOut">
               <a:rPr lang="ko-KR" altLang="en-US" smtClean="0"/>
-              <a:t>2024-08-03</a:t>
+              <a:t>2024-08-09</a:t>
             </a:fld>
             <a:endParaRPr lang="ko-KR" altLang="en-US"/>
           </a:p>
@@ -459,7 +459,7 @@
           <a:p>
             <a:fld id="{4E6F5B6F-16CC-4A24-B7E1-C8CC67323470}" type="datetimeFigureOut">
               <a:rPr lang="ko-KR" altLang="en-US" smtClean="0"/>
-              <a:t>2024-08-03</a:t>
+              <a:t>2024-08-09</a:t>
             </a:fld>
             <a:endParaRPr lang="ko-KR" altLang="en-US"/>
           </a:p>
@@ -667,7 +667,7 @@
           <a:p>
             <a:fld id="{4E6F5B6F-16CC-4A24-B7E1-C8CC67323470}" type="datetimeFigureOut">
               <a:rPr lang="ko-KR" altLang="en-US" smtClean="0"/>
-              <a:t>2024-08-03</a:t>
+              <a:t>2024-08-09</a:t>
             </a:fld>
             <a:endParaRPr lang="ko-KR" altLang="en-US"/>
           </a:p>
@@ -865,7 +865,7 @@
           <a:p>
             <a:fld id="{4E6F5B6F-16CC-4A24-B7E1-C8CC67323470}" type="datetimeFigureOut">
               <a:rPr lang="ko-KR" altLang="en-US" smtClean="0"/>
-              <a:t>2024-08-03</a:t>
+              <a:t>2024-08-09</a:t>
             </a:fld>
             <a:endParaRPr lang="ko-KR" altLang="en-US"/>
           </a:p>
@@ -1140,7 +1140,7 @@
           <a:p>
             <a:fld id="{4E6F5B6F-16CC-4A24-B7E1-C8CC67323470}" type="datetimeFigureOut">
               <a:rPr lang="ko-KR" altLang="en-US" smtClean="0"/>
-              <a:t>2024-08-03</a:t>
+              <a:t>2024-08-09</a:t>
             </a:fld>
             <a:endParaRPr lang="ko-KR" altLang="en-US"/>
           </a:p>
@@ -1405,7 +1405,7 @@
           <a:p>
             <a:fld id="{4E6F5B6F-16CC-4A24-B7E1-C8CC67323470}" type="datetimeFigureOut">
               <a:rPr lang="ko-KR" altLang="en-US" smtClean="0"/>
-              <a:t>2024-08-03</a:t>
+              <a:t>2024-08-09</a:t>
             </a:fld>
             <a:endParaRPr lang="ko-KR" altLang="en-US"/>
           </a:p>
@@ -1817,7 +1817,7 @@
           <a:p>
             <a:fld id="{4E6F5B6F-16CC-4A24-B7E1-C8CC67323470}" type="datetimeFigureOut">
               <a:rPr lang="ko-KR" altLang="en-US" smtClean="0"/>
-              <a:t>2024-08-03</a:t>
+              <a:t>2024-08-09</a:t>
             </a:fld>
             <a:endParaRPr lang="ko-KR" altLang="en-US"/>
           </a:p>
@@ -1958,7 +1958,7 @@
           <a:p>
             <a:fld id="{4E6F5B6F-16CC-4A24-B7E1-C8CC67323470}" type="datetimeFigureOut">
               <a:rPr lang="ko-KR" altLang="en-US" smtClean="0"/>
-              <a:t>2024-08-03</a:t>
+              <a:t>2024-08-09</a:t>
             </a:fld>
             <a:endParaRPr lang="ko-KR" altLang="en-US"/>
           </a:p>
@@ -2071,7 +2071,7 @@
           <a:p>
             <a:fld id="{4E6F5B6F-16CC-4A24-B7E1-C8CC67323470}" type="datetimeFigureOut">
               <a:rPr lang="ko-KR" altLang="en-US" smtClean="0"/>
-              <a:t>2024-08-03</a:t>
+              <a:t>2024-08-09</a:t>
             </a:fld>
             <a:endParaRPr lang="ko-KR" altLang="en-US"/>
           </a:p>
@@ -2382,7 +2382,7 @@
           <a:p>
             <a:fld id="{4E6F5B6F-16CC-4A24-B7E1-C8CC67323470}" type="datetimeFigureOut">
               <a:rPr lang="ko-KR" altLang="en-US" smtClean="0"/>
-              <a:t>2024-08-03</a:t>
+              <a:t>2024-08-09</a:t>
             </a:fld>
             <a:endParaRPr lang="ko-KR" altLang="en-US"/>
           </a:p>
@@ -2670,7 +2670,7 @@
           <a:p>
             <a:fld id="{4E6F5B6F-16CC-4A24-B7E1-C8CC67323470}" type="datetimeFigureOut">
               <a:rPr lang="ko-KR" altLang="en-US" smtClean="0"/>
-              <a:t>2024-08-03</a:t>
+              <a:t>2024-08-09</a:t>
             </a:fld>
             <a:endParaRPr lang="ko-KR" altLang="en-US"/>
           </a:p>
@@ -2911,7 +2911,7 @@
           <a:p>
             <a:fld id="{4E6F5B6F-16CC-4A24-B7E1-C8CC67323470}" type="datetimeFigureOut">
               <a:rPr lang="ko-KR" altLang="en-US" smtClean="0"/>
-              <a:t>2024-08-03</a:t>
+              <a:t>2024-08-09</a:t>
             </a:fld>
             <a:endParaRPr lang="ko-KR" altLang="en-US"/>
           </a:p>
@@ -3605,8 +3605,21 @@
                   <a:schemeClr val="tx1"/>
                 </a:solidFill>
               </a:rPr>
-              <a:t>단가로 찾기</a:t>
-            </a:r>
+              <a:t>단가로 찾기 </a:t>
+            </a:r>
+            <a:r>
+              <a:rPr lang="en-US" altLang="ko-KR" sz="1000" dirty="0">
+                <a:solidFill>
+                  <a:schemeClr val="tx1"/>
+                </a:solidFill>
+              </a:rPr>
+              <a:t>※</a:t>
+            </a:r>
+            <a:endParaRPr lang="ko-KR" altLang="en-US" sz="1000" dirty="0">
+              <a:solidFill>
+                <a:schemeClr val="tx1"/>
+              </a:solidFill>
+            </a:endParaRPr>
           </a:p>
         </p:txBody>
       </p:sp>

</xml_diff>